<commit_message>
last modifications of pptx file
</commit_message>
<xml_diff>
--- a/PyTorch MT.pptx
+++ b/PyTorch MT.pptx
@@ -20,15 +20,16 @@
     <p:sldId id="268" r:id="rId14"/>
     <p:sldId id="269" r:id="rId15"/>
     <p:sldId id="270" r:id="rId16"/>
-    <p:sldId id="271" r:id="rId17"/>
-    <p:sldId id="272" r:id="rId18"/>
-    <p:sldId id="273" r:id="rId19"/>
-    <p:sldId id="274" r:id="rId20"/>
-    <p:sldId id="275" r:id="rId21"/>
-    <p:sldId id="276" r:id="rId22"/>
-    <p:sldId id="277" r:id="rId23"/>
-    <p:sldId id="278" r:id="rId24"/>
-    <p:sldId id="279" r:id="rId25"/>
+    <p:sldId id="280" r:id="rId17"/>
+    <p:sldId id="271" r:id="rId18"/>
+    <p:sldId id="272" r:id="rId19"/>
+    <p:sldId id="273" r:id="rId20"/>
+    <p:sldId id="274" r:id="rId21"/>
+    <p:sldId id="275" r:id="rId22"/>
+    <p:sldId id="276" r:id="rId23"/>
+    <p:sldId id="277" r:id="rId24"/>
+    <p:sldId id="278" r:id="rId25"/>
+    <p:sldId id="279" r:id="rId26"/>
   </p:sldIdLst>
   <p:sldSz cx="12192000" cy="6858000"/>
   <p:notesSz cx="6858000" cy="9144000"/>
@@ -4626,15 +4627,7 @@
             <a:pPr algn="l" rtl="0"/>
             <a:r>
               <a:rPr lang="en-US" dirty="0"/>
-              <a:t>Why </a:t>
-            </a:r>
-            <a:r>
-              <a:rPr lang="en-US" dirty="0" err="1"/>
-              <a:t>PyTorch</a:t>
-            </a:r>
-            <a:r>
-              <a:rPr lang="en-US" dirty="0"/>
-              <a:t>?</a:t>
+              <a:t>Why PyTorch?</a:t>
             </a:r>
             <a:endParaRPr lang="ar-EG" dirty="0"/>
           </a:p>
@@ -4678,20 +4671,8 @@
               <a:buNone/>
             </a:pPr>
             <a:r>
-              <a:rPr lang="en-US" dirty="0" err="1"/>
-              <a:t>PyTorch</a:t>
-            </a:r>
-            <a:r>
-              <a:rPr lang="en-US" dirty="0"/>
-              <a:t> supports dynamic computational graphs, which means the network behavior can be changed programmatically at runtime. This facilitates more efficient model optimization and gives </a:t>
-            </a:r>
-            <a:r>
-              <a:rPr lang="en-US" dirty="0" err="1"/>
-              <a:t>PyTorch</a:t>
-            </a:r>
-            <a:r>
-              <a:rPr lang="en-US" dirty="0"/>
-              <a:t> a major advantage over other machine learning frameworks, which treat neural networks as static objects.</a:t>
+              <a:rPr lang="en-US" dirty="0"/>
+              <a:t>PyTorch supports dynamic computational graphs, which means the network behavior can be changed programmatically at runtime. This facilitates more efficient model optimization and gives PyTorch a major advantage over other machine learning frameworks, which treat neural networks as static objects.</a:t>
             </a:r>
           </a:p>
           <a:p>
@@ -4825,15 +4806,7 @@
             <a:pPr algn="l" rtl="0"/>
             <a:r>
               <a:rPr lang="en-US" dirty="0"/>
-              <a:t>Why </a:t>
-            </a:r>
-            <a:r>
-              <a:rPr lang="en-US" dirty="0" err="1"/>
-              <a:t>PyTorch</a:t>
-            </a:r>
-            <a:r>
-              <a:rPr lang="en-US" dirty="0"/>
-              <a:t>?</a:t>
+              <a:t>Why PyTorch?</a:t>
             </a:r>
             <a:endParaRPr lang="ar-EG" dirty="0"/>
           </a:p>
@@ -4882,12 +4855,8 @@
               <a:buNone/>
             </a:pPr>
             <a:r>
-              <a:rPr lang="en-US" dirty="0" err="1"/>
-              <a:t>PyTorch</a:t>
-            </a:r>
-            <a:r>
-              <a:rPr lang="en-US" dirty="0"/>
-              <a:t> also provides a new hybrid front-end. This means we have two modes of operation, namely eager mode and graph mode.</a:t>
+              <a:rPr lang="en-US" dirty="0"/>
+              <a:t>PyTorch also provides a new hybrid front-end. This means we have two modes of operation, namely eager mode and graph mode.</a:t>
             </a:r>
           </a:p>
           <a:p>
@@ -4992,15 +4961,7 @@
             <a:pPr algn="l" rtl="0"/>
             <a:r>
               <a:rPr lang="en-US" dirty="0"/>
-              <a:t>Why </a:t>
-            </a:r>
-            <a:r>
-              <a:rPr lang="en-US" dirty="0" err="1"/>
-              <a:t>PyTorch</a:t>
-            </a:r>
-            <a:r>
-              <a:rPr lang="en-US" dirty="0"/>
-              <a:t>?</a:t>
+              <a:t>Why PyTorch?</a:t>
             </a:r>
             <a:endParaRPr lang="ar-EG" dirty="0"/>
           </a:p>
@@ -5052,15 +5013,7 @@
             </a:pPr>
             <a:r>
               <a:rPr lang="en-US" dirty="0"/>
-              <a:t>A large community of developers have built many tools and libraries for extending </a:t>
-            </a:r>
-            <a:r>
-              <a:rPr lang="en-US" dirty="0" err="1"/>
-              <a:t>PyTorch</a:t>
-            </a:r>
-            <a:r>
-              <a:rPr lang="en-US" dirty="0"/>
-              <a:t>. The community is also supporting development in computer vision, reinforcement learning, and much more.</a:t>
+              <a:t>A large community of developers have built many tools and libraries for extending PyTorch. The community is also supporting development in computer vision, reinforcement learning, and much more.</a:t>
             </a:r>
           </a:p>
           <a:p>
@@ -5090,15 +5043,7 @@
             </a:r>
             <a:r>
               <a:rPr lang="en-US" dirty="0"/>
-              <a:t> is a highly efficient and modular implementation with GPU acceleration. It’s implemented in </a:t>
-            </a:r>
-            <a:r>
-              <a:rPr lang="en-US" dirty="0" err="1"/>
-              <a:t>PyTorch</a:t>
-            </a:r>
-            <a:r>
-              <a:rPr lang="en-US" dirty="0"/>
-              <a:t> and combines Gaussian processes with deep neural networks</a:t>
+              <a:t> is a highly efficient and modular implementation with GPU acceleration. It’s implemented in PyTorch and combines Gaussian processes with deep neural networks</a:t>
             </a:r>
             <a:r>
               <a:rPr lang="en-US" i="1" dirty="0"/>
@@ -5137,15 +5082,7 @@
             </a:r>
             <a:r>
               <a:rPr lang="en-US" dirty="0"/>
-              <a:t> is an open-source NLP research library, built on </a:t>
-            </a:r>
-            <a:r>
-              <a:rPr lang="en-US" dirty="0" err="1"/>
-              <a:t>PyTorch</a:t>
-            </a:r>
-            <a:r>
-              <a:rPr lang="en-US" dirty="0"/>
-              <a:t>.</a:t>
+              <a:t> is an open-source NLP research library, built on PyTorch.</a:t>
             </a:r>
           </a:p>
           <a:p>
@@ -5215,15 +5152,7 @@
             <a:pPr algn="l" rtl="0"/>
             <a:r>
               <a:rPr lang="en-US" dirty="0"/>
-              <a:t>Why </a:t>
-            </a:r>
-            <a:r>
-              <a:rPr lang="en-US" dirty="0" err="1"/>
-              <a:t>PyTorch</a:t>
-            </a:r>
-            <a:r>
-              <a:rPr lang="en-US" dirty="0"/>
-              <a:t>?</a:t>
+              <a:t>Why PyTorch?</a:t>
             </a:r>
             <a:endParaRPr lang="ar-EG" dirty="0"/>
           </a:p>
@@ -5283,12 +5212,8 @@
               <a:buNone/>
             </a:pPr>
             <a:r>
-              <a:rPr lang="en-US" dirty="0" err="1"/>
-              <a:t>PyTorch</a:t>
-            </a:r>
-            <a:r>
-              <a:rPr lang="en-US" dirty="0"/>
-              <a:t> has native ONNX support and can export models in the standard Open Neural Network Exchange format.</a:t>
+              <a:rPr lang="en-US" dirty="0"/>
+              <a:t>PyTorch has native ONNX support and can export models in the standard Open Neural Network Exchange format.</a:t>
             </a:r>
           </a:p>
           <a:p>
@@ -5401,15 +5326,7 @@
             <a:pPr algn="l" rtl="0"/>
             <a:r>
               <a:rPr lang="en-US" dirty="0"/>
-              <a:t>Why </a:t>
-            </a:r>
-            <a:r>
-              <a:rPr lang="en-US" dirty="0" err="1"/>
-              <a:t>PyTorch</a:t>
-            </a:r>
-            <a:r>
-              <a:rPr lang="en-US" dirty="0"/>
-              <a:t>?</a:t>
+              <a:t>Why PyTorch?</a:t>
             </a:r>
             <a:endParaRPr lang="ar-EG" dirty="0"/>
           </a:p>
@@ -5460,20 +5377,8 @@
               <a:buNone/>
             </a:pPr>
             <a:r>
-              <a:rPr lang="en-US" dirty="0" err="1"/>
-              <a:t>PyTorch</a:t>
-            </a:r>
-            <a:r>
-              <a:rPr lang="en-US" dirty="0"/>
-              <a:t> is also well-received by major cloud platforms, allowing developers and engineers to do large-scale training jobs on GPUs with </a:t>
-            </a:r>
-            <a:r>
-              <a:rPr lang="en-US" dirty="0" err="1"/>
-              <a:t>PyTorch</a:t>
-            </a:r>
-            <a:r>
-              <a:rPr lang="en-US" dirty="0"/>
-              <a:t>.</a:t>
+              <a:rPr lang="en-US" dirty="0"/>
+              <a:t>PyTorch is also well-received by major cloud platforms, allowing developers and engineers to do large-scale training jobs on GPUs with PyTorch.</a:t>
             </a:r>
           </a:p>
           <a:p>
@@ -5486,27 +5391,13 @@
             </a:r>
             <a:r>
               <a:rPr lang="en-US" dirty="0"/>
-              <a:t> cloud support also provides the ability to run models in a production environment. Not only that, we can also scale our </a:t>
-            </a:r>
-            <a:r>
-              <a:rPr lang="en-US" dirty="0" err="1"/>
-              <a:t>PyTorch</a:t>
-            </a:r>
-            <a:r>
-              <a:rPr lang="en-US" dirty="0"/>
-              <a:t> model using the cloud. For example, you can use the below code to work with </a:t>
-            </a:r>
-            <a:r>
-              <a:rPr lang="en-US" dirty="0" err="1">
-                <a:hlinkClick r:id="rId2"/>
-              </a:rPr>
-              <a:t>PyTorch</a:t>
+              <a:t> cloud support also provides the ability to run models in a production environment. Not only that, we can also scale our PyTorch model using the cloud. For example, you can use the below code to work with </a:t>
             </a:r>
             <a:r>
               <a:rPr lang="en-US" dirty="0">
                 <a:hlinkClick r:id="rId2"/>
               </a:rPr>
-              <a:t> using AWS </a:t>
+              <a:t>PyTorch using AWS </a:t>
             </a:r>
             <a:r>
               <a:rPr lang="en-US" dirty="0" err="1">
@@ -5593,7 +5484,7 @@
           <p:cNvPr id="2" name="Title 1">
             <a:extLst>
               <a:ext uri="{FF2B5EF4-FFF2-40B4-BE49-F238E27FC236}">
-                <a16:creationId xmlns:a16="http://schemas.microsoft.com/office/drawing/2014/main" id="{87079FCF-699C-4998-8EB8-DAB3570EA46D}"/>
+                <a16:creationId xmlns:a16="http://schemas.microsoft.com/office/drawing/2014/main" id="{3FD6F68D-1E2F-41AB-9E06-5FAED486F6EB}"/>
               </a:ext>
             </a:extLst>
           </p:cNvPr>
@@ -5612,11 +5503,8 @@
             <a:pPr algn="l" rtl="0"/>
             <a:r>
               <a:rPr lang="en-US" dirty="0"/>
-              <a:t>What is Machine Translation (MT)?</a:t>
-            </a:r>
-            <a:br>
-              <a:rPr lang="en-US" dirty="0"/>
-            </a:br>
+              <a:t>Why PyTorch?</a:t>
+            </a:r>
             <a:endParaRPr lang="ar-EG" dirty="0"/>
           </a:p>
         </p:txBody>
@@ -5626,7 +5514,7 @@
           <p:cNvPr id="3" name="Content Placeholder 2">
             <a:extLst>
               <a:ext uri="{FF2B5EF4-FFF2-40B4-BE49-F238E27FC236}">
-                <a16:creationId xmlns:a16="http://schemas.microsoft.com/office/drawing/2014/main" id="{3AD61F1D-E079-4C46-8C5D-E7AB62F78D35}"/>
+                <a16:creationId xmlns:a16="http://schemas.microsoft.com/office/drawing/2014/main" id="{221FB4EA-1DF6-49B6-994C-8EB9C24E4E59}"/>
               </a:ext>
             </a:extLst>
           </p:cNvPr>
@@ -5634,51 +5522,86 @@
             <a:spLocks noGrp="1"/>
           </p:cNvSpPr>
           <p:nvPr>
-            <p:ph idx="1"/>
-          </p:nvPr>
-        </p:nvSpPr>
-        <p:spPr>
-          <a:xfrm>
-            <a:off x="2382982" y="1764145"/>
-            <a:ext cx="8348947" cy="4627419"/>
-          </a:xfrm>
-        </p:spPr>
-        <p:txBody>
-          <a:bodyPr>
-            <a:normAutofit fontScale="85000" lnSpcReduction="10000"/>
-          </a:bodyPr>
-          <a:lstStyle/>
-          <a:p>
-            <a:pPr algn="l" rtl="0" fontAlgn="base"/>
-            <a:r>
-              <a:rPr lang="en-US" dirty="0"/>
-              <a:t>Machine translation (MT) refers to fully automated software that can translate source content into target languages. Humans may use MT to help them render text and speech into another language, or the MT software may operate without human intervention.</a:t>
-            </a:r>
-          </a:p>
-          <a:p>
-            <a:pPr algn="l" rtl="0" fontAlgn="base"/>
-            <a:r>
-              <a:rPr lang="en-US" dirty="0"/>
-              <a:t>MT tools are often used to translate vast amounts of information involving millions of words that could not possibly be translated the traditional way. The quality of MT output can vary considerably; MT systems require “training” in the desired domain and language pair to increase quality.</a:t>
-            </a:r>
-          </a:p>
-          <a:p>
-            <a:pPr algn="l" rtl="0" fontAlgn="base"/>
-            <a:r>
-              <a:rPr lang="en-US" dirty="0"/>
-              <a:t>Translation companies use MT to augment productivity of their translators, cut costs, and provide post-editing services to clients. MT use by language service providers is growing quickly. In 2016, SDL—one of the largest translation companies in the world—announced it translates 20 times more content with MT than with human teams.</a:t>
-            </a:r>
-          </a:p>
+            <p:ph sz="half" idx="1"/>
+          </p:nvPr>
+        </p:nvSpPr>
+        <p:spPr>
+          <a:xfrm>
+            <a:off x="1736436" y="2052116"/>
+            <a:ext cx="3894222" cy="3997828"/>
+          </a:xfrm>
+        </p:spPr>
+        <p:txBody>
+          <a:bodyPr/>
+          <a:lstStyle/>
           <a:p>
             <a:pPr algn="l" rtl="0"/>
-            <a:endParaRPr lang="ar-EG" dirty="0"/>
-          </a:p>
-        </p:txBody>
-      </p:sp>
+            <a:r>
+              <a:rPr lang="en-US" dirty="0"/>
+              <a:t>Many cloud providers changed their DL platforms into PyTorch, so Why PyTorch</a:t>
+            </a:r>
+          </a:p>
+        </p:txBody>
+      </p:sp>
+      <p:sp>
+        <p:nvSpPr>
+          <p:cNvPr id="6" name="Content Placeholder 5">
+            <a:extLst>
+              <a:ext uri="{FF2B5EF4-FFF2-40B4-BE49-F238E27FC236}">
+                <a16:creationId xmlns:a16="http://schemas.microsoft.com/office/drawing/2014/main" id="{09AC2930-C583-4700-89F0-821257A3643D}"/>
+              </a:ext>
+            </a:extLst>
+          </p:cNvPr>
+          <p:cNvSpPr>
+            <a:spLocks noGrp="1"/>
+          </p:cNvSpPr>
+          <p:nvPr>
+            <p:ph sz="half" idx="2"/>
+          </p:nvPr>
+        </p:nvSpPr>
+        <p:spPr/>
+        <p:txBody>
+          <a:bodyPr/>
+          <a:lstStyle/>
+          <a:p>
+            <a:endParaRPr lang="ar-EG"/>
+          </a:p>
+        </p:txBody>
+      </p:sp>
+      <p:pic>
+        <p:nvPicPr>
+          <p:cNvPr id="5" name="Picture 4">
+            <a:extLst>
+              <a:ext uri="{FF2B5EF4-FFF2-40B4-BE49-F238E27FC236}">
+                <a16:creationId xmlns:a16="http://schemas.microsoft.com/office/drawing/2014/main" id="{9250DC23-660D-45F0-978D-190203062E65}"/>
+              </a:ext>
+            </a:extLst>
+          </p:cNvPr>
+          <p:cNvPicPr>
+            <a:picLocks noChangeAspect="1"/>
+          </p:cNvPicPr>
+          <p:nvPr/>
+        </p:nvPicPr>
+        <p:blipFill>
+          <a:blip r:embed="rId2"/>
+          <a:stretch>
+            <a:fillRect/>
+          </a:stretch>
+        </p:blipFill>
+        <p:spPr>
+          <a:xfrm>
+            <a:off x="5761472" y="1370553"/>
+            <a:ext cx="5540220" cy="5418290"/>
+          </a:xfrm>
+          <a:prstGeom prst="rect">
+            <a:avLst/>
+          </a:prstGeom>
+        </p:spPr>
+      </p:pic>
     </p:spTree>
     <p:extLst>
       <p:ext uri="{BB962C8B-B14F-4D97-AF65-F5344CB8AC3E}">
-        <p14:creationId xmlns:p14="http://schemas.microsoft.com/office/powerpoint/2010/main" val="263898327"/>
+        <p14:creationId xmlns:p14="http://schemas.microsoft.com/office/powerpoint/2010/main" val="2582047797"/>
       </p:ext>
     </p:extLst>
   </p:cSld>
@@ -5710,6 +5633,123 @@
           <p:cNvPr id="2" name="Title 1">
             <a:extLst>
               <a:ext uri="{FF2B5EF4-FFF2-40B4-BE49-F238E27FC236}">
+                <a16:creationId xmlns:a16="http://schemas.microsoft.com/office/drawing/2014/main" id="{87079FCF-699C-4998-8EB8-DAB3570EA46D}"/>
+              </a:ext>
+            </a:extLst>
+          </p:cNvPr>
+          <p:cNvSpPr>
+            <a:spLocks noGrp="1"/>
+          </p:cNvSpPr>
+          <p:nvPr>
+            <p:ph type="title"/>
+          </p:nvPr>
+        </p:nvSpPr>
+        <p:spPr/>
+        <p:txBody>
+          <a:bodyPr/>
+          <a:lstStyle/>
+          <a:p>
+            <a:pPr algn="l" rtl="0"/>
+            <a:r>
+              <a:rPr lang="en-US" dirty="0"/>
+              <a:t>What is Machine Translation (MT)?</a:t>
+            </a:r>
+            <a:br>
+              <a:rPr lang="en-US" dirty="0"/>
+            </a:br>
+            <a:endParaRPr lang="ar-EG" dirty="0"/>
+          </a:p>
+        </p:txBody>
+      </p:sp>
+      <p:sp>
+        <p:nvSpPr>
+          <p:cNvPr id="3" name="Content Placeholder 2">
+            <a:extLst>
+              <a:ext uri="{FF2B5EF4-FFF2-40B4-BE49-F238E27FC236}">
+                <a16:creationId xmlns:a16="http://schemas.microsoft.com/office/drawing/2014/main" id="{3AD61F1D-E079-4C46-8C5D-E7AB62F78D35}"/>
+              </a:ext>
+            </a:extLst>
+          </p:cNvPr>
+          <p:cNvSpPr>
+            <a:spLocks noGrp="1"/>
+          </p:cNvSpPr>
+          <p:nvPr>
+            <p:ph idx="1"/>
+          </p:nvPr>
+        </p:nvSpPr>
+        <p:spPr>
+          <a:xfrm>
+            <a:off x="2382982" y="1764145"/>
+            <a:ext cx="8348947" cy="4627419"/>
+          </a:xfrm>
+        </p:spPr>
+        <p:txBody>
+          <a:bodyPr>
+            <a:normAutofit fontScale="85000" lnSpcReduction="10000"/>
+          </a:bodyPr>
+          <a:lstStyle/>
+          <a:p>
+            <a:pPr algn="l" rtl="0" fontAlgn="base"/>
+            <a:r>
+              <a:rPr lang="en-US" dirty="0"/>
+              <a:t>Machine translation (MT) refers to fully automated software that can translate source content into target languages. Humans may use MT to help them render text and speech into another language, or the MT software may operate without human intervention.</a:t>
+            </a:r>
+          </a:p>
+          <a:p>
+            <a:pPr algn="l" rtl="0" fontAlgn="base"/>
+            <a:r>
+              <a:rPr lang="en-US" dirty="0"/>
+              <a:t>MT tools are often used to translate vast amounts of information involving millions of words that could not possibly be translated the traditional way. The quality of MT output can vary considerably; MT systems require “training” in the desired domain and language pair to increase quality.</a:t>
+            </a:r>
+          </a:p>
+          <a:p>
+            <a:pPr algn="l" rtl="0" fontAlgn="base"/>
+            <a:r>
+              <a:rPr lang="en-US" dirty="0"/>
+              <a:t>Translation companies use MT to augment productivity of their translators, cut costs, and provide post-editing services to clients. MT use by language service providers is growing quickly. In 2016, SDL—one of the largest translation companies in the world—announced it translates 20 times more content with MT than with human teams.</a:t>
+            </a:r>
+          </a:p>
+          <a:p>
+            <a:pPr algn="l" rtl="0"/>
+            <a:endParaRPr lang="ar-EG" dirty="0"/>
+          </a:p>
+        </p:txBody>
+      </p:sp>
+    </p:spTree>
+    <p:extLst>
+      <p:ext uri="{BB962C8B-B14F-4D97-AF65-F5344CB8AC3E}">
+        <p14:creationId xmlns:p14="http://schemas.microsoft.com/office/powerpoint/2010/main" val="263898327"/>
+      </p:ext>
+    </p:extLst>
+  </p:cSld>
+  <p:clrMapOvr>
+    <a:masterClrMapping/>
+  </p:clrMapOvr>
+</p:sld>
+</file>
+
+<file path=ppt/slides/slide18.xml><?xml version="1.0" encoding="utf-8"?>
+<p:sld xmlns:a="http://schemas.openxmlformats.org/drawingml/2006/main" xmlns:r="http://schemas.openxmlformats.org/officeDocument/2006/relationships" xmlns:p="http://schemas.openxmlformats.org/presentationml/2006/main">
+  <p:cSld>
+    <p:spTree>
+      <p:nvGrpSpPr>
+        <p:cNvPr id="1" name=""/>
+        <p:cNvGrpSpPr/>
+        <p:nvPr/>
+      </p:nvGrpSpPr>
+      <p:grpSpPr>
+        <a:xfrm>
+          <a:off x="0" y="0"/>
+          <a:ext cx="0" cy="0"/>
+          <a:chOff x="0" y="0"/>
+          <a:chExt cx="0" cy="0"/>
+        </a:xfrm>
+      </p:grpSpPr>
+      <p:sp>
+        <p:nvSpPr>
+          <p:cNvPr id="2" name="Title 1">
+            <a:extLst>
+              <a:ext uri="{FF2B5EF4-FFF2-40B4-BE49-F238E27FC236}">
                 <a16:creationId xmlns:a16="http://schemas.microsoft.com/office/drawing/2014/main" id="{90B0AD7A-4E14-440D-BDF7-A1E25FF7D947}"/>
               </a:ext>
             </a:extLst>
@@ -5835,7 +5875,7 @@
 </p:sld>
 </file>
 
-<file path=ppt/slides/slide18.xml><?xml version="1.0" encoding="utf-8"?>
+<file path=ppt/slides/slide19.xml><?xml version="1.0" encoding="utf-8"?>
 <p:sld xmlns:a="http://schemas.openxmlformats.org/drawingml/2006/main" xmlns:r="http://schemas.openxmlformats.org/officeDocument/2006/relationships" xmlns:p="http://schemas.openxmlformats.org/presentationml/2006/main">
   <p:cSld>
     <p:spTree>
@@ -5895,160 +5935,6 @@
 </p:sld>
 </file>
 
-<file path=ppt/slides/slide19.xml><?xml version="1.0" encoding="utf-8"?>
-<p:sld xmlns:a="http://schemas.openxmlformats.org/drawingml/2006/main" xmlns:r="http://schemas.openxmlformats.org/officeDocument/2006/relationships" xmlns:p="http://schemas.openxmlformats.org/presentationml/2006/main">
-  <p:cSld>
-    <p:spTree>
-      <p:nvGrpSpPr>
-        <p:cNvPr id="1" name=""/>
-        <p:cNvGrpSpPr/>
-        <p:nvPr/>
-      </p:nvGrpSpPr>
-      <p:grpSpPr>
-        <a:xfrm>
-          <a:off x="0" y="0"/>
-          <a:ext cx="0" cy="0"/>
-          <a:chOff x="0" y="0"/>
-          <a:chExt cx="0" cy="0"/>
-        </a:xfrm>
-      </p:grpSpPr>
-      <p:sp>
-        <p:nvSpPr>
-          <p:cNvPr id="2" name="Title 1">
-            <a:extLst>
-              <a:ext uri="{FF2B5EF4-FFF2-40B4-BE49-F238E27FC236}">
-                <a16:creationId xmlns:a16="http://schemas.microsoft.com/office/drawing/2014/main" id="{C23E5852-FDA3-4E18-843F-0CB442810858}"/>
-              </a:ext>
-            </a:extLst>
-          </p:cNvPr>
-          <p:cNvSpPr>
-            <a:spLocks noGrp="1"/>
-          </p:cNvSpPr>
-          <p:nvPr>
-            <p:ph type="title"/>
-          </p:nvPr>
-        </p:nvSpPr>
-        <p:spPr/>
-        <p:txBody>
-          <a:bodyPr/>
-          <a:lstStyle/>
-          <a:p>
-            <a:pPr algn="l" rtl="0"/>
-            <a:r>
-              <a:rPr lang="en-US" dirty="0"/>
-              <a:t>Seq2Sqs Models</a:t>
-            </a:r>
-            <a:br>
-              <a:rPr lang="en-US" dirty="0"/>
-            </a:br>
-            <a:endParaRPr lang="ar-EG" dirty="0"/>
-          </a:p>
-        </p:txBody>
-      </p:sp>
-      <p:sp>
-        <p:nvSpPr>
-          <p:cNvPr id="3" name="Content Placeholder 2">
-            <a:extLst>
-              <a:ext uri="{FF2B5EF4-FFF2-40B4-BE49-F238E27FC236}">
-                <a16:creationId xmlns:a16="http://schemas.microsoft.com/office/drawing/2014/main" id="{ABD6A019-528B-4ED8-BDF9-FD68457C7BF9}"/>
-              </a:ext>
-            </a:extLst>
-          </p:cNvPr>
-          <p:cNvSpPr>
-            <a:spLocks noGrp="1"/>
-          </p:cNvSpPr>
-          <p:nvPr>
-            <p:ph idx="1"/>
-          </p:nvPr>
-        </p:nvSpPr>
-        <p:spPr>
-          <a:xfrm>
-            <a:off x="2773599" y="1487055"/>
-            <a:ext cx="7796540" cy="2733963"/>
-          </a:xfrm>
-        </p:spPr>
-        <p:txBody>
-          <a:bodyPr>
-            <a:normAutofit fontScale="92500"/>
-          </a:bodyPr>
-          <a:lstStyle/>
-          <a:p>
-            <a:pPr algn="l" rtl="0"/>
-            <a:r>
-              <a:rPr lang="en-US" dirty="0"/>
-              <a:t>A Recurrent Neural Network, or RNN, is a network that operates on a sequence and uses its own output as input for subsequent steps.</a:t>
-            </a:r>
-          </a:p>
-          <a:p>
-            <a:pPr algn="l" rtl="0"/>
-            <a:r>
-              <a:rPr lang="en-US" dirty="0"/>
-              <a:t>A Sequence to Sequence network, or seq2seq network, or Encoder Decoder network, is a model consisting of two RNNs called the encoder and decoder. The encoder reads an input sequence and outputs a single vector, and the decoder reads that vector to produce an output sequence.</a:t>
-            </a:r>
-            <a:endParaRPr lang="ar-EG" dirty="0"/>
-          </a:p>
-        </p:txBody>
-      </p:sp>
-      <p:pic>
-        <p:nvPicPr>
-          <p:cNvPr id="3076" name="Picture 4">
-            <a:extLst>
-              <a:ext uri="{FF2B5EF4-FFF2-40B4-BE49-F238E27FC236}">
-                <a16:creationId xmlns:a16="http://schemas.microsoft.com/office/drawing/2014/main" id="{2164E722-24BC-4E8E-881A-2EDB24806C85}"/>
-              </a:ext>
-            </a:extLst>
-          </p:cNvPr>
-          <p:cNvPicPr>
-            <a:picLocks noChangeAspect="1" noChangeArrowheads="1"/>
-          </p:cNvPicPr>
-          <p:nvPr/>
-        </p:nvPicPr>
-        <p:blipFill>
-          <a:blip r:embed="rId2">
-            <a:extLst>
-              <a:ext uri="{28A0092B-C50C-407E-A947-70E740481C1C}">
-                <a14:useLocalDpi xmlns:a14="http://schemas.microsoft.com/office/drawing/2010/main" val="0"/>
-              </a:ext>
-            </a:extLst>
-          </a:blip>
-          <a:srcRect/>
-          <a:stretch>
-            <a:fillRect/>
-          </a:stretch>
-        </p:blipFill>
-        <p:spPr bwMode="auto">
-          <a:xfrm>
-            <a:off x="3861089" y="4467230"/>
-            <a:ext cx="4857750" cy="2190750"/>
-          </a:xfrm>
-          <a:prstGeom prst="rect">
-            <a:avLst/>
-          </a:prstGeom>
-          <a:noFill/>
-          <a:extLst>
-            <a:ext uri="{909E8E84-426E-40DD-AFC4-6F175D3DCCD1}">
-              <a14:hiddenFill xmlns:a14="http://schemas.microsoft.com/office/drawing/2010/main">
-                <a:solidFill>
-                  <a:srgbClr val="FFFFFF"/>
-                </a:solidFill>
-              </a14:hiddenFill>
-            </a:ext>
-          </a:extLst>
-        </p:spPr>
-      </p:pic>
-    </p:spTree>
-    <p:extLst>
-      <p:ext uri="{BB962C8B-B14F-4D97-AF65-F5344CB8AC3E}">
-        <p14:creationId xmlns:p14="http://schemas.microsoft.com/office/powerpoint/2010/main" val="2942965544"/>
-      </p:ext>
-    </p:extLst>
-  </p:cSld>
-  <p:clrMapOvr>
-    <a:masterClrMapping/>
-  </p:clrMapOvr>
-</p:sld>
-</file>
-
 <file path=ppt/slides/slide2.xml><?xml version="1.0" encoding="utf-8"?>
 <p:sld xmlns:a="http://schemas.openxmlformats.org/drawingml/2006/main" xmlns:r="http://schemas.openxmlformats.org/officeDocument/2006/relationships" xmlns:p="http://schemas.openxmlformats.org/presentationml/2006/main">
   <p:cSld>
@@ -6120,30 +6006,14 @@
             <a:pPr algn="l" rtl="0"/>
             <a:r>
               <a:rPr lang="en-US" dirty="0"/>
-              <a:t>What is </a:t>
-            </a:r>
-            <a:r>
-              <a:rPr lang="en-US" dirty="0" err="1"/>
-              <a:t>PyTorch</a:t>
-            </a:r>
-            <a:r>
-              <a:rPr lang="en-US" dirty="0"/>
-              <a:t>?</a:t>
+              <a:t>What is PyTorch?</a:t>
             </a:r>
           </a:p>
           <a:p>
             <a:pPr algn="l" rtl="0"/>
             <a:r>
               <a:rPr lang="en-US" dirty="0"/>
-              <a:t>Why </a:t>
-            </a:r>
-            <a:r>
-              <a:rPr lang="en-US" dirty="0" err="1"/>
-              <a:t>PyTorch</a:t>
-            </a:r>
-            <a:r>
-              <a:rPr lang="en-US" dirty="0"/>
-              <a:t>?</a:t>
+              <a:t>Why PyTorch?</a:t>
             </a:r>
           </a:p>
           <a:p>
@@ -6222,6 +6092,160 @@
           <p:cNvPr id="2" name="Title 1">
             <a:extLst>
               <a:ext uri="{FF2B5EF4-FFF2-40B4-BE49-F238E27FC236}">
+                <a16:creationId xmlns:a16="http://schemas.microsoft.com/office/drawing/2014/main" id="{C23E5852-FDA3-4E18-843F-0CB442810858}"/>
+              </a:ext>
+            </a:extLst>
+          </p:cNvPr>
+          <p:cNvSpPr>
+            <a:spLocks noGrp="1"/>
+          </p:cNvSpPr>
+          <p:nvPr>
+            <p:ph type="title"/>
+          </p:nvPr>
+        </p:nvSpPr>
+        <p:spPr/>
+        <p:txBody>
+          <a:bodyPr/>
+          <a:lstStyle/>
+          <a:p>
+            <a:pPr algn="l" rtl="0"/>
+            <a:r>
+              <a:rPr lang="en-US" dirty="0"/>
+              <a:t>Seq2Sqs Models</a:t>
+            </a:r>
+            <a:br>
+              <a:rPr lang="en-US" dirty="0"/>
+            </a:br>
+            <a:endParaRPr lang="ar-EG" dirty="0"/>
+          </a:p>
+        </p:txBody>
+      </p:sp>
+      <p:sp>
+        <p:nvSpPr>
+          <p:cNvPr id="3" name="Content Placeholder 2">
+            <a:extLst>
+              <a:ext uri="{FF2B5EF4-FFF2-40B4-BE49-F238E27FC236}">
+                <a16:creationId xmlns:a16="http://schemas.microsoft.com/office/drawing/2014/main" id="{ABD6A019-528B-4ED8-BDF9-FD68457C7BF9}"/>
+              </a:ext>
+            </a:extLst>
+          </p:cNvPr>
+          <p:cNvSpPr>
+            <a:spLocks noGrp="1"/>
+          </p:cNvSpPr>
+          <p:nvPr>
+            <p:ph idx="1"/>
+          </p:nvPr>
+        </p:nvSpPr>
+        <p:spPr>
+          <a:xfrm>
+            <a:off x="2773599" y="1487055"/>
+            <a:ext cx="7796540" cy="2733963"/>
+          </a:xfrm>
+        </p:spPr>
+        <p:txBody>
+          <a:bodyPr>
+            <a:normAutofit fontScale="92500"/>
+          </a:bodyPr>
+          <a:lstStyle/>
+          <a:p>
+            <a:pPr algn="l" rtl="0"/>
+            <a:r>
+              <a:rPr lang="en-US" dirty="0"/>
+              <a:t>A Recurrent Neural Network, or RNN, is a network that operates on a sequence and uses its own output as input for subsequent steps.</a:t>
+            </a:r>
+          </a:p>
+          <a:p>
+            <a:pPr algn="l" rtl="0"/>
+            <a:r>
+              <a:rPr lang="en-US" dirty="0"/>
+              <a:t>A Sequence to Sequence network, or seq2seq network, or Encoder Decoder network, is a model consisting of two RNNs called the encoder and decoder. The encoder reads an input sequence and outputs a single vector, and the decoder reads that vector to produce an output sequence.</a:t>
+            </a:r>
+            <a:endParaRPr lang="ar-EG" dirty="0"/>
+          </a:p>
+        </p:txBody>
+      </p:sp>
+      <p:pic>
+        <p:nvPicPr>
+          <p:cNvPr id="3076" name="Picture 4">
+            <a:extLst>
+              <a:ext uri="{FF2B5EF4-FFF2-40B4-BE49-F238E27FC236}">
+                <a16:creationId xmlns:a16="http://schemas.microsoft.com/office/drawing/2014/main" id="{2164E722-24BC-4E8E-881A-2EDB24806C85}"/>
+              </a:ext>
+            </a:extLst>
+          </p:cNvPr>
+          <p:cNvPicPr>
+            <a:picLocks noChangeAspect="1" noChangeArrowheads="1"/>
+          </p:cNvPicPr>
+          <p:nvPr/>
+        </p:nvPicPr>
+        <p:blipFill>
+          <a:blip r:embed="rId2">
+            <a:extLst>
+              <a:ext uri="{28A0092B-C50C-407E-A947-70E740481C1C}">
+                <a14:useLocalDpi xmlns:a14="http://schemas.microsoft.com/office/drawing/2010/main" val="0"/>
+              </a:ext>
+            </a:extLst>
+          </a:blip>
+          <a:srcRect/>
+          <a:stretch>
+            <a:fillRect/>
+          </a:stretch>
+        </p:blipFill>
+        <p:spPr bwMode="auto">
+          <a:xfrm>
+            <a:off x="3861089" y="4467230"/>
+            <a:ext cx="4857750" cy="2190750"/>
+          </a:xfrm>
+          <a:prstGeom prst="rect">
+            <a:avLst/>
+          </a:prstGeom>
+          <a:noFill/>
+          <a:extLst>
+            <a:ext uri="{909E8E84-426E-40DD-AFC4-6F175D3DCCD1}">
+              <a14:hiddenFill xmlns:a14="http://schemas.microsoft.com/office/drawing/2010/main">
+                <a:solidFill>
+                  <a:srgbClr val="FFFFFF"/>
+                </a:solidFill>
+              </a14:hiddenFill>
+            </a:ext>
+          </a:extLst>
+        </p:spPr>
+      </p:pic>
+    </p:spTree>
+    <p:extLst>
+      <p:ext uri="{BB962C8B-B14F-4D97-AF65-F5344CB8AC3E}">
+        <p14:creationId xmlns:p14="http://schemas.microsoft.com/office/powerpoint/2010/main" val="2942965544"/>
+      </p:ext>
+    </p:extLst>
+  </p:cSld>
+  <p:clrMapOvr>
+    <a:masterClrMapping/>
+  </p:clrMapOvr>
+</p:sld>
+</file>
+
+<file path=ppt/slides/slide21.xml><?xml version="1.0" encoding="utf-8"?>
+<p:sld xmlns:a="http://schemas.openxmlformats.org/drawingml/2006/main" xmlns:r="http://schemas.openxmlformats.org/officeDocument/2006/relationships" xmlns:p="http://schemas.openxmlformats.org/presentationml/2006/main">
+  <p:cSld>
+    <p:spTree>
+      <p:nvGrpSpPr>
+        <p:cNvPr id="1" name=""/>
+        <p:cNvGrpSpPr/>
+        <p:nvPr/>
+      </p:nvGrpSpPr>
+      <p:grpSpPr>
+        <a:xfrm>
+          <a:off x="0" y="0"/>
+          <a:ext cx="0" cy="0"/>
+          <a:chOff x="0" y="0"/>
+          <a:chExt cx="0" cy="0"/>
+        </a:xfrm>
+      </p:grpSpPr>
+      <p:sp>
+        <p:nvSpPr>
+          <p:cNvPr id="2" name="Title 1">
+            <a:extLst>
+              <a:ext uri="{FF2B5EF4-FFF2-40B4-BE49-F238E27FC236}">
                 <a16:creationId xmlns:a16="http://schemas.microsoft.com/office/drawing/2014/main" id="{239A255C-7C7D-4576-AF5E-E434A3A5D0D8}"/>
               </a:ext>
             </a:extLst>
@@ -6323,7 +6347,7 @@
 </p:sld>
 </file>
 
-<file path=ppt/slides/slide21.xml><?xml version="1.0" encoding="utf-8"?>
+<file path=ppt/slides/slide22.xml><?xml version="1.0" encoding="utf-8"?>
 <p:sld xmlns:a="http://schemas.openxmlformats.org/drawingml/2006/main" xmlns:r="http://schemas.openxmlformats.org/officeDocument/2006/relationships" xmlns:p="http://schemas.openxmlformats.org/presentationml/2006/main">
   <p:cSld>
     <p:spTree>
@@ -6485,134 +6509,6 @@
 </p:sld>
 </file>
 
-<file path=ppt/slides/slide22.xml><?xml version="1.0" encoding="utf-8"?>
-<p:sld xmlns:a="http://schemas.openxmlformats.org/drawingml/2006/main" xmlns:r="http://schemas.openxmlformats.org/officeDocument/2006/relationships" xmlns:p="http://schemas.openxmlformats.org/presentationml/2006/main">
-  <p:cSld>
-    <p:spTree>
-      <p:nvGrpSpPr>
-        <p:cNvPr id="1" name=""/>
-        <p:cNvGrpSpPr/>
-        <p:nvPr/>
-      </p:nvGrpSpPr>
-      <p:grpSpPr>
-        <a:xfrm>
-          <a:off x="0" y="0"/>
-          <a:ext cx="0" cy="0"/>
-          <a:chOff x="0" y="0"/>
-          <a:chExt cx="0" cy="0"/>
-        </a:xfrm>
-      </p:grpSpPr>
-      <p:sp>
-        <p:nvSpPr>
-          <p:cNvPr id="2" name="Title 1">
-            <a:extLst>
-              <a:ext uri="{FF2B5EF4-FFF2-40B4-BE49-F238E27FC236}">
-                <a16:creationId xmlns:a16="http://schemas.microsoft.com/office/drawing/2014/main" id="{B8035C90-AAF9-41E5-BABC-D26C579FA4C2}"/>
-              </a:ext>
-            </a:extLst>
-          </p:cNvPr>
-          <p:cNvSpPr>
-            <a:spLocks noGrp="1"/>
-          </p:cNvSpPr>
-          <p:nvPr>
-            <p:ph type="title"/>
-          </p:nvPr>
-        </p:nvSpPr>
-        <p:spPr/>
-        <p:txBody>
-          <a:bodyPr/>
-          <a:lstStyle/>
-          <a:p>
-            <a:pPr algn="l" rtl="0"/>
-            <a:r>
-              <a:rPr lang="en-US" dirty="0"/>
-              <a:t>Further Readings</a:t>
-            </a:r>
-            <a:br>
-              <a:rPr lang="en-US" dirty="0"/>
-            </a:br>
-            <a:endParaRPr lang="ar-EG" dirty="0"/>
-          </a:p>
-        </p:txBody>
-      </p:sp>
-      <p:sp>
-        <p:nvSpPr>
-          <p:cNvPr id="3" name="Content Placeholder 2">
-            <a:extLst>
-              <a:ext uri="{FF2B5EF4-FFF2-40B4-BE49-F238E27FC236}">
-                <a16:creationId xmlns:a16="http://schemas.microsoft.com/office/drawing/2014/main" id="{7B12B891-E8E5-4A84-AD19-47DD21999E27}"/>
-              </a:ext>
-            </a:extLst>
-          </p:cNvPr>
-          <p:cNvSpPr>
-            <a:spLocks noGrp="1"/>
-          </p:cNvSpPr>
-          <p:nvPr>
-            <p:ph idx="1"/>
-          </p:nvPr>
-        </p:nvSpPr>
-        <p:spPr/>
-        <p:txBody>
-          <a:bodyPr/>
-          <a:lstStyle/>
-          <a:p>
-            <a:pPr algn="l" rtl="0"/>
-            <a:r>
-              <a:rPr lang="en-US" b="1" dirty="0">
-                <a:hlinkClick r:id="rId2"/>
-              </a:rPr>
-              <a:t>Sequence to Sequence Learning with Neural Networks</a:t>
-            </a:r>
-            <a:endParaRPr lang="en-US" b="1" dirty="0"/>
-          </a:p>
-          <a:p>
-            <a:pPr algn="l" rtl="0"/>
-            <a:r>
-              <a:rPr lang="en-US" b="1" dirty="0">
-                <a:hlinkClick r:id="rId3"/>
-              </a:rPr>
-              <a:t>Neural Machine Translation by Jointly Learning to Align and Translate</a:t>
-            </a:r>
-            <a:endParaRPr lang="en-US" b="1" dirty="0"/>
-          </a:p>
-          <a:p>
-            <a:pPr algn="l" rtl="0"/>
-            <a:r>
-              <a:rPr lang="en-US" b="1" dirty="0">
-                <a:hlinkClick r:id="rId4"/>
-              </a:rPr>
-              <a:t>A Neural Conversational Model</a:t>
-            </a:r>
-            <a:endParaRPr lang="en-US" b="1" dirty="0"/>
-          </a:p>
-          <a:p>
-            <a:pPr algn="l" rtl="0"/>
-            <a:r>
-              <a:rPr lang="en-US" b="1" dirty="0">
-                <a:hlinkClick r:id="rId5"/>
-              </a:rPr>
-              <a:t>Effective Approaches to Attention-based Neural Machine Translation</a:t>
-            </a:r>
-            <a:br>
-              <a:rPr lang="en-US" dirty="0"/>
-            </a:br>
-            <a:endParaRPr lang="ar-EG" dirty="0"/>
-          </a:p>
-        </p:txBody>
-      </p:sp>
-    </p:spTree>
-    <p:extLst>
-      <p:ext uri="{BB962C8B-B14F-4D97-AF65-F5344CB8AC3E}">
-        <p14:creationId xmlns:p14="http://schemas.microsoft.com/office/powerpoint/2010/main" val="1898665985"/>
-      </p:ext>
-    </p:extLst>
-  </p:cSld>
-  <p:clrMapOvr>
-    <a:masterClrMapping/>
-  </p:clrMapOvr>
-</p:sld>
-</file>
-
 <file path=ppt/slides/slide23.xml><?xml version="1.0" encoding="utf-8"?>
 <p:sld xmlns:a="http://schemas.openxmlformats.org/drawingml/2006/main" xmlns:r="http://schemas.openxmlformats.org/officeDocument/2006/relationships" xmlns:p="http://schemas.openxmlformats.org/presentationml/2006/main">
   <p:cSld>
@@ -6635,7 +6531,7 @@
           <p:cNvPr id="2" name="Title 1">
             <a:extLst>
               <a:ext uri="{FF2B5EF4-FFF2-40B4-BE49-F238E27FC236}">
-                <a16:creationId xmlns:a16="http://schemas.microsoft.com/office/drawing/2014/main" id="{CAC15B91-3FB5-419B-9A7B-5AEEA1D98693}"/>
+                <a16:creationId xmlns:a16="http://schemas.microsoft.com/office/drawing/2014/main" id="{B8035C90-AAF9-41E5-BABC-D26C579FA4C2}"/>
               </a:ext>
             </a:extLst>
           </p:cNvPr>
@@ -6654,7 +6550,7 @@
             <a:pPr algn="l" rtl="0"/>
             <a:r>
               <a:rPr lang="en-US" dirty="0"/>
-              <a:t>Code Time</a:t>
+              <a:t>Further Readings</a:t>
             </a:r>
             <a:br>
               <a:rPr lang="en-US" dirty="0"/>
@@ -6668,7 +6564,7 @@
           <p:cNvPr id="3" name="Content Placeholder 2">
             <a:extLst>
               <a:ext uri="{FF2B5EF4-FFF2-40B4-BE49-F238E27FC236}">
-                <a16:creationId xmlns:a16="http://schemas.microsoft.com/office/drawing/2014/main" id="{E0EE14F8-A92B-4826-A79C-9AA82ED93EC4}"/>
+                <a16:creationId xmlns:a16="http://schemas.microsoft.com/office/drawing/2014/main" id="{7B12B891-E8E5-4A84-AD19-47DD21999E27}"/>
               </a:ext>
             </a:extLst>
           </p:cNvPr>
@@ -6684,14 +6580,54 @@
           <a:bodyPr/>
           <a:lstStyle/>
           <a:p>
-            <a:endParaRPr lang="ar-EG"/>
+            <a:pPr algn="l" rtl="0"/>
+            <a:r>
+              <a:rPr lang="en-US" b="1" dirty="0">
+                <a:hlinkClick r:id="rId2"/>
+              </a:rPr>
+              <a:t>Sequence to Sequence Learning with Neural Networks</a:t>
+            </a:r>
+            <a:endParaRPr lang="en-US" b="1" dirty="0"/>
+          </a:p>
+          <a:p>
+            <a:pPr algn="l" rtl="0"/>
+            <a:r>
+              <a:rPr lang="en-US" b="1" dirty="0">
+                <a:hlinkClick r:id="rId3"/>
+              </a:rPr>
+              <a:t>Neural Machine Translation by Jointly Learning to Align and Translate</a:t>
+            </a:r>
+            <a:endParaRPr lang="en-US" b="1" dirty="0"/>
+          </a:p>
+          <a:p>
+            <a:pPr algn="l" rtl="0"/>
+            <a:r>
+              <a:rPr lang="en-US" b="1" dirty="0">
+                <a:hlinkClick r:id="rId4"/>
+              </a:rPr>
+              <a:t>A Neural Conversational Model</a:t>
+            </a:r>
+            <a:endParaRPr lang="en-US" b="1" dirty="0"/>
+          </a:p>
+          <a:p>
+            <a:pPr algn="l" rtl="0"/>
+            <a:r>
+              <a:rPr lang="en-US" b="1" dirty="0">
+                <a:hlinkClick r:id="rId5"/>
+              </a:rPr>
+              <a:t>Effective Approaches to Attention-based Neural Machine Translation</a:t>
+            </a:r>
+            <a:br>
+              <a:rPr lang="en-US" dirty="0"/>
+            </a:br>
+            <a:endParaRPr lang="ar-EG" dirty="0"/>
           </a:p>
         </p:txBody>
       </p:sp>
     </p:spTree>
     <p:extLst>
       <p:ext uri="{BB962C8B-B14F-4D97-AF65-F5344CB8AC3E}">
-        <p14:creationId xmlns:p14="http://schemas.microsoft.com/office/powerpoint/2010/main" val="4032008866"/>
+        <p14:creationId xmlns:p14="http://schemas.microsoft.com/office/powerpoint/2010/main" val="1898665985"/>
       </p:ext>
     </p:extLst>
   </p:cSld>
@@ -6723,6 +6659,155 @@
           <p:cNvPr id="2" name="Title 1">
             <a:extLst>
               <a:ext uri="{FF2B5EF4-FFF2-40B4-BE49-F238E27FC236}">
+                <a16:creationId xmlns:a16="http://schemas.microsoft.com/office/drawing/2014/main" id="{CAC15B91-3FB5-419B-9A7B-5AEEA1D98693}"/>
+              </a:ext>
+            </a:extLst>
+          </p:cNvPr>
+          <p:cNvSpPr>
+            <a:spLocks noGrp="1"/>
+          </p:cNvSpPr>
+          <p:nvPr>
+            <p:ph type="title"/>
+          </p:nvPr>
+        </p:nvSpPr>
+        <p:spPr/>
+        <p:txBody>
+          <a:bodyPr/>
+          <a:lstStyle/>
+          <a:p>
+            <a:pPr algn="l" rtl="0"/>
+            <a:r>
+              <a:rPr lang="en-US" dirty="0"/>
+              <a:t>Code Time</a:t>
+            </a:r>
+            <a:br>
+              <a:rPr lang="en-US" dirty="0"/>
+            </a:br>
+            <a:endParaRPr lang="ar-EG" dirty="0"/>
+          </a:p>
+        </p:txBody>
+      </p:sp>
+      <p:sp>
+        <p:nvSpPr>
+          <p:cNvPr id="3" name="Content Placeholder 2">
+            <a:extLst>
+              <a:ext uri="{FF2B5EF4-FFF2-40B4-BE49-F238E27FC236}">
+                <a16:creationId xmlns:a16="http://schemas.microsoft.com/office/drawing/2014/main" id="{E0EE14F8-A92B-4826-A79C-9AA82ED93EC4}"/>
+              </a:ext>
+            </a:extLst>
+          </p:cNvPr>
+          <p:cNvSpPr>
+            <a:spLocks noGrp="1"/>
+          </p:cNvSpPr>
+          <p:nvPr>
+            <p:ph idx="1"/>
+          </p:nvPr>
+        </p:nvSpPr>
+        <p:spPr>
+          <a:xfrm>
+            <a:off x="2773599" y="2052116"/>
+            <a:ext cx="7796540" cy="764975"/>
+          </a:xfrm>
+        </p:spPr>
+        <p:txBody>
+          <a:bodyPr/>
+          <a:lstStyle/>
+          <a:p>
+            <a:pPr marL="0" indent="0" algn="l" rtl="0">
+              <a:buNone/>
+            </a:pPr>
+            <a:r>
+              <a:rPr lang="en-US" dirty="0">
+                <a:hlinkClick r:id="rId2"/>
+              </a:rPr>
+              <a:t>https://github.com/mma1979/pytorch-mt-workshop</a:t>
+            </a:r>
+            <a:endParaRPr lang="ar-EG" dirty="0"/>
+          </a:p>
+        </p:txBody>
+      </p:sp>
+      <p:pic>
+        <p:nvPicPr>
+          <p:cNvPr id="5122" name="Picture 2">
+            <a:extLst>
+              <a:ext uri="{FF2B5EF4-FFF2-40B4-BE49-F238E27FC236}">
+                <a16:creationId xmlns:a16="http://schemas.microsoft.com/office/drawing/2014/main" id="{D48256F7-4604-4507-9DB8-CB0526AADE67}"/>
+              </a:ext>
+            </a:extLst>
+          </p:cNvPr>
+          <p:cNvPicPr>
+            <a:picLocks noChangeAspect="1" noChangeArrowheads="1"/>
+          </p:cNvPicPr>
+          <p:nvPr/>
+        </p:nvPicPr>
+        <p:blipFill>
+          <a:blip r:embed="rId3">
+            <a:extLst>
+              <a:ext uri="{28A0092B-C50C-407E-A947-70E740481C1C}">
+                <a14:useLocalDpi xmlns:a14="http://schemas.microsoft.com/office/drawing/2010/main" val="0"/>
+              </a:ext>
+            </a:extLst>
+          </a:blip>
+          <a:srcRect/>
+          <a:stretch>
+            <a:fillRect/>
+          </a:stretch>
+        </p:blipFill>
+        <p:spPr bwMode="auto">
+          <a:xfrm>
+            <a:off x="4414981" y="2902526"/>
+            <a:ext cx="2670464" cy="2670464"/>
+          </a:xfrm>
+          <a:prstGeom prst="rect">
+            <a:avLst/>
+          </a:prstGeom>
+          <a:noFill/>
+          <a:extLst>
+            <a:ext uri="{909E8E84-426E-40DD-AFC4-6F175D3DCCD1}">
+              <a14:hiddenFill xmlns:a14="http://schemas.microsoft.com/office/drawing/2010/main">
+                <a:solidFill>
+                  <a:srgbClr val="FFFFFF"/>
+                </a:solidFill>
+              </a14:hiddenFill>
+            </a:ext>
+          </a:extLst>
+        </p:spPr>
+      </p:pic>
+    </p:spTree>
+    <p:extLst>
+      <p:ext uri="{BB962C8B-B14F-4D97-AF65-F5344CB8AC3E}">
+        <p14:creationId xmlns:p14="http://schemas.microsoft.com/office/powerpoint/2010/main" val="4032008866"/>
+      </p:ext>
+    </p:extLst>
+  </p:cSld>
+  <p:clrMapOvr>
+    <a:masterClrMapping/>
+  </p:clrMapOvr>
+</p:sld>
+</file>
+
+<file path=ppt/slides/slide25.xml><?xml version="1.0" encoding="utf-8"?>
+<p:sld xmlns:a="http://schemas.openxmlformats.org/drawingml/2006/main" xmlns:r="http://schemas.openxmlformats.org/officeDocument/2006/relationships" xmlns:p="http://schemas.openxmlformats.org/presentationml/2006/main">
+  <p:cSld>
+    <p:spTree>
+      <p:nvGrpSpPr>
+        <p:cNvPr id="1" name=""/>
+        <p:cNvGrpSpPr/>
+        <p:nvPr/>
+      </p:nvGrpSpPr>
+      <p:grpSpPr>
+        <a:xfrm>
+          <a:off x="0" y="0"/>
+          <a:ext cx="0" cy="0"/>
+          <a:chOff x="0" y="0"/>
+          <a:chExt cx="0" cy="0"/>
+        </a:xfrm>
+      </p:grpSpPr>
+      <p:sp>
+        <p:nvSpPr>
+          <p:cNvPr id="2" name="Title 1">
+            <a:extLst>
+              <a:ext uri="{FF2B5EF4-FFF2-40B4-BE49-F238E27FC236}">
                 <a16:creationId xmlns:a16="http://schemas.microsoft.com/office/drawing/2014/main" id="{6B2C0B8F-D031-4B51-9F0B-3E7785C80323}"/>
               </a:ext>
             </a:extLst>
@@ -6766,8 +6851,8 @@
         </p:nvSpPr>
         <p:spPr>
           <a:xfrm>
-            <a:off x="1893455" y="2052116"/>
-            <a:ext cx="8676684" cy="3997828"/>
+            <a:off x="1265382" y="2181425"/>
+            <a:ext cx="8072582" cy="3739084"/>
           </a:xfrm>
         </p:spPr>
         <p:txBody>
@@ -6897,7 +6982,7 @@
         </p:blipFill>
         <p:spPr>
           <a:xfrm>
-            <a:off x="8758197" y="89370"/>
+            <a:off x="8412018" y="937491"/>
             <a:ext cx="2514600" cy="2514600"/>
           </a:xfrm>
           <a:prstGeom prst="rect">
@@ -6997,12 +7082,8 @@
               <a:buNone/>
             </a:pPr>
             <a:r>
-              <a:rPr lang="en-US" dirty="0" err="1"/>
-              <a:t>PyTorch</a:t>
-            </a:r>
-            <a:r>
-              <a:rPr lang="en-US" dirty="0"/>
-              <a:t> is an open source machine learning library used primarily for applications such as computer vision and natural language processing.</a:t>
+              <a:rPr lang="en-US" dirty="0"/>
+              <a:t>PyTorch is an open source machine learning library used primarily for applications such as computer vision and natural language processing.</a:t>
             </a:r>
           </a:p>
           <a:p>
@@ -7124,15 +7205,7 @@
             <a:pPr algn="l" rtl="0"/>
             <a:r>
               <a:rPr lang="en-US" dirty="0"/>
-              <a:t>Why </a:t>
-            </a:r>
-            <a:r>
-              <a:rPr lang="en-US" dirty="0" err="1"/>
-              <a:t>PyTorch</a:t>
-            </a:r>
-            <a:r>
-              <a:rPr lang="en-US" dirty="0"/>
-              <a:t>?</a:t>
+              <a:t>Why PyTorch?</a:t>
             </a:r>
             <a:br>
               <a:rPr lang="en-US" dirty="0"/>
@@ -7166,12 +7239,8 @@
               <a:buAutoNum type="arabicPeriod"/>
             </a:pPr>
             <a:r>
-              <a:rPr lang="en-US" b="1" dirty="0" err="1"/>
-              <a:t>PyTorch</a:t>
-            </a:r>
-            <a:r>
               <a:rPr lang="en-US" b="1" dirty="0"/>
-              <a:t> is Pythonic</a:t>
+              <a:t>PyTorch is Pythonic</a:t>
             </a:r>
           </a:p>
           <a:p>
@@ -7179,20 +7248,8 @@
               <a:buNone/>
             </a:pPr>
             <a:r>
-              <a:rPr lang="en-US" dirty="0" err="1"/>
-              <a:t>PyTorch</a:t>
-            </a:r>
-            <a:r>
-              <a:rPr lang="en-US" dirty="0"/>
-              <a:t> is built to be seamlessly integrated with Python and its popular libraries like NumPy. Check out the code snippet below to see how easy it is to manipulate a NumPy array using </a:t>
-            </a:r>
-            <a:r>
-              <a:rPr lang="en-US" dirty="0" err="1"/>
-              <a:t>PyTorch</a:t>
-            </a:r>
-            <a:r>
-              <a:rPr lang="en-US" dirty="0"/>
-              <a:t>:</a:t>
+              <a:rPr lang="en-US" dirty="0"/>
+              <a:t>PyTorch is built to be seamlessly integrated with Python and its popular libraries like NumPy. Check out the code snippet below to see how easy it is to manipulate a NumPy array using PyTorch:</a:t>
             </a:r>
             <a:endParaRPr lang="en-US" b="1" dirty="0"/>
           </a:p>
@@ -7358,15 +7415,7 @@
             <a:pPr algn="l" rtl="0"/>
             <a:r>
               <a:rPr lang="en-US" dirty="0"/>
-              <a:t>Why </a:t>
-            </a:r>
-            <a:r>
-              <a:rPr lang="en-US" dirty="0" err="1"/>
-              <a:t>PyTorch</a:t>
-            </a:r>
-            <a:r>
-              <a:rPr lang="en-US" dirty="0"/>
-              <a:t>?</a:t>
+              <a:t>Why PyTorch?</a:t>
             </a:r>
             <a:endParaRPr lang="ar-EG" dirty="0"/>
           </a:p>
@@ -7406,12 +7455,8 @@
               <a:buNone/>
             </a:pPr>
             <a:r>
-              <a:rPr lang="en-US" dirty="0" err="1"/>
-              <a:t>PyTorch</a:t>
-            </a:r>
-            <a:r>
-              <a:rPr lang="en-US" dirty="0"/>
-              <a:t> is comparatively easier to learn than other deep learning frameworks. This is because its syntax and application are similar to many conventional programming languages like Python.</a:t>
+              <a:rPr lang="en-US" dirty="0"/>
+              <a:t>PyTorch is comparatively easier to learn than other deep learning frameworks. This is because its syntax and application are similar to many conventional programming languages like Python.</a:t>
             </a:r>
           </a:p>
           <a:p>
@@ -7424,15 +7469,7 @@
             </a:r>
             <a:r>
               <a:rPr lang="en-US" dirty="0"/>
-              <a:t> documentation is also very organized and helpful for beginners. And a focused community of developers are also helping to continuously improve </a:t>
-            </a:r>
-            <a:r>
-              <a:rPr lang="en-US" dirty="0" err="1"/>
-              <a:t>PyTorch</a:t>
-            </a:r>
-            <a:r>
-              <a:rPr lang="en-US" dirty="0"/>
-              <a:t>.</a:t>
+              <a:t> documentation is also very organized and helpful for beginners. And a focused community of developers are also helping to continuously improve PyTorch.</a:t>
             </a:r>
             <a:endParaRPr lang="en-US" b="1" dirty="0"/>
           </a:p>
@@ -7538,15 +7575,7 @@
             <a:pPr algn="l" rtl="0"/>
             <a:r>
               <a:rPr lang="en-US" dirty="0"/>
-              <a:t>Why </a:t>
-            </a:r>
-            <a:r>
-              <a:rPr lang="en-US" dirty="0" err="1"/>
-              <a:t>PyTorch</a:t>
-            </a:r>
-            <a:r>
-              <a:rPr lang="en-US" dirty="0"/>
-              <a:t>?</a:t>
+              <a:t>Why PyTorch?</a:t>
             </a:r>
             <a:endParaRPr lang="ar-EG" dirty="0"/>
           </a:p>
@@ -7590,12 +7619,8 @@
               <a:buNone/>
             </a:pPr>
             <a:r>
-              <a:rPr lang="en-US" dirty="0" err="1"/>
-              <a:t>PyTorch</a:t>
-            </a:r>
-            <a:r>
-              <a:rPr lang="en-US" dirty="0"/>
-              <a:t> is very simple to use, which also means that the learning curve for developers is relatively short.</a:t>
+              <a:rPr lang="en-US" dirty="0"/>
+              <a:t>PyTorch is very simple to use, which also means that the learning curve for developers is relatively short.</a:t>
             </a:r>
           </a:p>
           <a:p>
@@ -7696,15 +7721,7 @@
             <a:pPr algn="l" rtl="0"/>
             <a:r>
               <a:rPr lang="en-US" dirty="0"/>
-              <a:t>Why </a:t>
-            </a:r>
-            <a:r>
-              <a:rPr lang="en-US" dirty="0" err="1"/>
-              <a:t>PyTorch</a:t>
-            </a:r>
-            <a:r>
-              <a:rPr lang="en-US" dirty="0"/>
-              <a:t>?</a:t>
+              <a:t>Why PyTorch?</a:t>
             </a:r>
             <a:endParaRPr lang="ar-EG" dirty="0"/>
           </a:p>
@@ -7750,23 +7767,7 @@
             </a:pPr>
             <a:r>
               <a:rPr lang="en-US" dirty="0"/>
-              <a:t>As </a:t>
-            </a:r>
-            <a:r>
-              <a:rPr lang="en-US" dirty="0" err="1"/>
-              <a:t>PyTorch</a:t>
-            </a:r>
-            <a:r>
-              <a:rPr lang="en-US" dirty="0"/>
-              <a:t> is deeply integrated with Python, many Python debugging tools can also be used in </a:t>
-            </a:r>
-            <a:r>
-              <a:rPr lang="en-US" dirty="0" err="1"/>
-              <a:t>PyTorch</a:t>
-            </a:r>
-            <a:r>
-              <a:rPr lang="en-US" dirty="0"/>
-              <a:t> code. Specifically, Python’s </a:t>
+              <a:t>As PyTorch is deeply integrated with Python, many Python debugging tools can also be used in PyTorch code. Specifically, Python’s </a:t>
             </a:r>
             <a:r>
               <a:rPr lang="en-US" dirty="0" err="1">
@@ -7786,15 +7787,7 @@
             </a:r>
             <a:r>
               <a:rPr lang="en-US" dirty="0"/>
-              <a:t> tools can be used for this kind of debugging in </a:t>
-            </a:r>
-            <a:r>
-              <a:rPr lang="en-US" dirty="0" err="1"/>
-              <a:t>PyTorch</a:t>
-            </a:r>
-            <a:r>
-              <a:rPr lang="en-US" dirty="0"/>
-              <a:t>.</a:t>
+              <a:t> tools can be used for this kind of debugging in PyTorch.</a:t>
             </a:r>
           </a:p>
           <a:p>
@@ -7907,15 +7900,7 @@
             <a:pPr algn="l" rtl="0"/>
             <a:r>
               <a:rPr lang="en-US" dirty="0"/>
-              <a:t>Why </a:t>
-            </a:r>
-            <a:r>
-              <a:rPr lang="en-US" dirty="0" err="1"/>
-              <a:t>PyTorch</a:t>
-            </a:r>
-            <a:r>
-              <a:rPr lang="en-US" dirty="0"/>
-              <a:t>?</a:t>
+              <a:t>Why PyTorch?</a:t>
             </a:r>
             <a:endParaRPr lang="ar-EG" dirty="0"/>
           </a:p>
@@ -7966,20 +7951,8 @@
               <a:buNone/>
             </a:pPr>
             <a:r>
-              <a:rPr lang="en-US" dirty="0" err="1"/>
-              <a:t>PyTorch</a:t>
-            </a:r>
-            <a:r>
-              <a:rPr lang="en-US" dirty="0"/>
-              <a:t> has a very useful feature known as data parallelism. Using this feature, </a:t>
-            </a:r>
-            <a:r>
-              <a:rPr lang="en-US" dirty="0" err="1"/>
-              <a:t>PyTorch</a:t>
-            </a:r>
-            <a:r>
-              <a:rPr lang="en-US" dirty="0"/>
-              <a:t> can distribute computational work among multiple CPU or GPU cores.</a:t>
+              <a:rPr lang="en-US" dirty="0"/>
+              <a:t>PyTorch has a very useful feature known as data parallelism. Using this feature, PyTorch can distribute computational work among multiple CPU or GPU cores.</a:t>
             </a:r>
           </a:p>
           <a:p>
@@ -7988,15 +7961,7 @@
             </a:pPr>
             <a:r>
               <a:rPr lang="en-US" dirty="0"/>
-              <a:t>This feature of </a:t>
-            </a:r>
-            <a:r>
-              <a:rPr lang="en-US" dirty="0" err="1"/>
-              <a:t>PyTorch</a:t>
-            </a:r>
-            <a:r>
-              <a:rPr lang="en-US" dirty="0"/>
-              <a:t> allows us to use </a:t>
+              <a:t>This feature of PyTorch allows us to use </a:t>
             </a:r>
             <a:r>
               <a:rPr lang="en-US" dirty="0" err="1"/>

</xml_diff>